<commit_message>
added link to repo in presentation
</commit_message>
<xml_diff>
--- a/presentation.pptx
+++ b/presentation.pptx
@@ -13709,7 +13709,17 @@
           <a:p>
             <a:r>
               <a:rPr lang="en-US" dirty="0"/>
-              <a:t>Download &lt;repo&gt; and import into IDE</a:t>
+              <a:t>Download </a:t>
+            </a:r>
+            <a:r>
+              <a:rPr lang="en-US" dirty="0">
+                <a:hlinkClick r:id="rId3"/>
+              </a:rPr>
+              <a:t>https://github.com/jdifebo/java8</a:t>
+            </a:r>
+            <a:r>
+              <a:rPr lang="en-US" dirty="0"/>
+              <a:t> and import into IDE</a:t>
             </a:r>
           </a:p>
           <a:p>
@@ -13764,13 +13774,8 @@
             <a:pPr lvl="1"/>
             <a:r>
               <a:rPr lang="en-US" dirty="0"/>
-              <a:t>Each method can be implemented in a single line by </a:t>
-            </a:r>
-            <a:r>
-              <a:rPr lang="en-US"/>
-              <a:t>chaining Stream operations!</a:t>
-            </a:r>
-            <a:endParaRPr lang="en-US" dirty="0"/>
+              <a:t>Each method can be implemented in a single line by chaining Stream operations!</a:t>
+            </a:r>
           </a:p>
         </p:txBody>
       </p:sp>

</xml_diff>

<commit_message>
more fixes before presentation
</commit_message>
<xml_diff>
--- a/presentation.pptx
+++ b/presentation.pptx
@@ -9825,7 +9825,7 @@
               <a:rPr lang="en-US" dirty="0">
                 <a:latin typeface="Courier New"/>
               </a:rPr>
-              <a:t>String name</a:t>
+              <a:t>String office</a:t>
             </a:r>
             <a:r>
               <a:rPr lang="en-US" dirty="0">
@@ -9843,7 +9843,7 @@
               <a:rPr lang="en-US" dirty="0">
                 <a:latin typeface="Calibri" charset="0"/>
               </a:rPr>
-              <a:t> if any employee in the list has that name</a:t>
+              <a:t> if any employee in the list has that office</a:t>
             </a:r>
           </a:p>
         </p:txBody>
@@ -9855,7 +9855,7 @@
           <p:nvPr>
             <p:extLst>
               <p:ext uri="{D42A27DB-BD31-4B8C-83A1-F6EECF244321}">
-                <p14:modId xmlns:p14="http://schemas.microsoft.com/office/powerpoint/2010/main" val="2782576524"/>
+                <p14:modId xmlns:p14="http://schemas.microsoft.com/office/powerpoint/2010/main" val="2877202732"/>
               </p:ext>
             </p:extLst>
           </p:nvPr>
@@ -9886,7 +9886,7 @@
                     <a:lstStyle/>
                     <a:p>
                       <a:r>
-                        <a:rPr lang="en-US"/>
+                        <a:rPr lang="en-US" dirty="0"/>
                         <a:t>Without Java 8</a:t>
                       </a:r>
                     </a:p>
@@ -9927,92 +9927,13 @@
                         <a:rPr lang="en-US" dirty="0" err="1">
                           <a:latin typeface="Courier New" charset="0"/>
                         </a:rPr>
-                        <a:t>containsName</a:t>
-                      </a:r>
-                      <a:r>
-                        <a:rPr lang="en-US" dirty="0">
-                          <a:latin typeface="Courier New" charset="0"/>
-                        </a:rPr>
-                        <a:t>(String name) {</a:t>
-                      </a:r>
-                      <a:br>
-                        <a:rPr lang="en-US" dirty="0">
-                          <a:latin typeface="Courier New" charset="0"/>
-                        </a:rPr>
-                      </a:br>
-                      <a:r>
-                        <a:rPr lang="en-US" dirty="0">
-                          <a:latin typeface="Courier New" charset="0"/>
-                        </a:rPr>
-                        <a:t>    for (Employee </a:t>
-                      </a:r>
-                      <a:r>
-                        <a:rPr lang="en-US" dirty="0" err="1">
-                          <a:latin typeface="Courier New" charset="0"/>
-                        </a:rPr>
-                        <a:t>employee</a:t>
-                      </a:r>
-                      <a:r>
-                        <a:rPr lang="en-US" dirty="0">
-                          <a:latin typeface="Courier New" charset="0"/>
-                        </a:rPr>
-                        <a:t> : employees){</a:t>
-                      </a:r>
-                      <a:br>
-                        <a:rPr lang="en-US" dirty="0">
-                          <a:latin typeface="Courier New" charset="0"/>
-                        </a:rPr>
-                      </a:br>
-                      <a:r>
-                        <a:rPr lang="en-US" dirty="0">
-                          <a:latin typeface="Courier New" charset="0"/>
-                        </a:rPr>
-                        <a:t>        if (</a:t>
-                      </a:r>
-                      <a:r>
-                        <a:rPr lang="en-US" dirty="0" err="1">
-                          <a:latin typeface="Courier New" charset="0"/>
-                        </a:rPr>
-                        <a:t>employee.getName</a:t>
-                      </a:r>
-                      <a:r>
-                        <a:rPr lang="en-US" dirty="0">
-                          <a:latin typeface="Courier New" charset="0"/>
-                        </a:rPr>
-                        <a:t>().equals(name)){</a:t>
-                      </a:r>
-                      <a:br>
-                        <a:rPr lang="en-US" dirty="0">
-                          <a:latin typeface="Courier New" charset="0"/>
-                        </a:rPr>
-                      </a:br>
-                      <a:r>
-                        <a:rPr lang="en-US" dirty="0">
-                          <a:latin typeface="Courier New" charset="0"/>
-                        </a:rPr>
-                        <a:t>            return true;</a:t>
-                      </a:r>
-                      <a:br>
-                        <a:rPr lang="en-US" dirty="0">
-                          <a:latin typeface="Courier New" charset="0"/>
-                        </a:rPr>
-                      </a:br>
-                      <a:r>
-                        <a:rPr lang="en-US" dirty="0">
-                          <a:latin typeface="Courier New" charset="0"/>
-                        </a:rPr>
-                        <a:t>       }</a:t>
-                      </a:r>
-                      <a:br>
-                        <a:rPr lang="en-US" dirty="0">
-                          <a:latin typeface="Courier New" charset="0"/>
-                        </a:rPr>
-                      </a:br>
-                      <a:r>
-                        <a:rPr lang="en-US" dirty="0">
-                          <a:latin typeface="Courier New" charset="0"/>
-                        </a:rPr>
-                        <a:t>    }</a:t>
+                        <a:t>existsEmployeeAtOffice</a:t>
+                      </a:r>
+                      <a:r>
+                        <a:rPr lang="en-US" dirty="0">
+                          <a:latin typeface="Courier New" charset="0"/>
+                        </a:rPr>
+                        <a:t>(String office){</a:t>
                       </a:r>
                     </a:p>
                     <a:p>
@@ -10020,13 +9941,74 @@
                         <a:rPr lang="en-US" dirty="0">
                           <a:latin typeface="Courier New" charset="0"/>
                         </a:rPr>
-                        <a:t>    return false;</a:t>
-                      </a:r>
-                      <a:br>
-                        <a:rPr lang="en-US" dirty="0">
-                          <a:latin typeface="Courier New" charset="0"/>
-                        </a:rPr>
-                      </a:br>
+                        <a:t>	for (Employee </a:t>
+                      </a:r>
+                      <a:r>
+                        <a:rPr lang="en-US" dirty="0" err="1">
+                          <a:latin typeface="Courier New" charset="0"/>
+                        </a:rPr>
+                        <a:t>employee</a:t>
+                      </a:r>
+                      <a:r>
+                        <a:rPr lang="en-US" dirty="0">
+                          <a:latin typeface="Courier New" charset="0"/>
+                        </a:rPr>
+                        <a:t> : employees){</a:t>
+                      </a:r>
+                    </a:p>
+                    <a:p>
+                      <a:r>
+                        <a:rPr lang="en-US" dirty="0">
+                          <a:latin typeface="Courier New" charset="0"/>
+                        </a:rPr>
+                        <a:t>		if (</a:t>
+                      </a:r>
+                      <a:r>
+                        <a:rPr lang="en-US" dirty="0" err="1">
+                          <a:latin typeface="Courier New" charset="0"/>
+                        </a:rPr>
+                        <a:t>employee.getOffice</a:t>
+                      </a:r>
+                      <a:r>
+                        <a:rPr lang="en-US" dirty="0">
+                          <a:latin typeface="Courier New" charset="0"/>
+                        </a:rPr>
+                        <a:t>().equals(office)){</a:t>
+                      </a:r>
+                    </a:p>
+                    <a:p>
+                      <a:r>
+                        <a:rPr lang="en-US" dirty="0">
+                          <a:latin typeface="Courier New" charset="0"/>
+                        </a:rPr>
+                        <a:t>			return true;</a:t>
+                      </a:r>
+                    </a:p>
+                    <a:p>
+                      <a:r>
+                        <a:rPr lang="en-US" dirty="0">
+                          <a:latin typeface="Courier New" charset="0"/>
+                        </a:rPr>
+                        <a:t>		}</a:t>
+                      </a:r>
+                    </a:p>
+                    <a:p>
+                      <a:r>
+                        <a:rPr lang="en-US" dirty="0">
+                          <a:latin typeface="Courier New" charset="0"/>
+                        </a:rPr>
+                        <a:t>	}</a:t>
+                      </a:r>
+                    </a:p>
+                    <a:p>
+                      <a:r>
+                        <a:rPr lang="en-US" dirty="0">
+                          <a:latin typeface="Courier New" charset="0"/>
+                        </a:rPr>
+                        <a:t>	return false;</a:t>
+                      </a:r>
+                    </a:p>
+                    <a:p>
                       <a:r>
                         <a:rPr lang="en-US" dirty="0">
                           <a:latin typeface="Courier New" charset="0"/>
@@ -10123,7 +10105,12 @@
             <p:ph idx="1"/>
           </p:nvPr>
         </p:nvSpPr>
-        <p:spPr/>
+        <p:spPr>
+          <a:xfrm>
+            <a:off x="838200" y="1825624"/>
+            <a:ext cx="10515600" cy="4513031"/>
+          </a:xfrm>
+        </p:spPr>
         <p:txBody>
           <a:bodyPr vert="horz" lIns="91440" tIns="45720" rIns="91440" bIns="45720" rtlCol="0" anchor="t">
             <a:normAutofit/>
@@ -10140,7 +10127,7 @@
               <a:rPr lang="en-US" dirty="0">
                 <a:latin typeface="Courier New"/>
               </a:rPr>
-              <a:t>String name</a:t>
+              <a:t>String office</a:t>
             </a:r>
             <a:r>
               <a:rPr lang="en-US" dirty="0">
@@ -10158,7 +10145,7 @@
               <a:rPr lang="en-US" dirty="0">
                 <a:latin typeface="Calibri" charset="0"/>
               </a:rPr>
-              <a:t> if any employee in the list has that name</a:t>
+              <a:t> if any employee in the list has that office</a:t>
             </a:r>
           </a:p>
           <a:p>
@@ -10167,16 +10154,25 @@
             </a:endParaRPr>
           </a:p>
           <a:p>
+            <a:pPr marL="0" indent="0">
+              <a:buNone/>
+            </a:pPr>
             <a:endParaRPr lang="en-US" dirty="0">
               <a:latin typeface="Calibri" charset="0"/>
             </a:endParaRPr>
           </a:p>
           <a:p>
+            <a:pPr marL="0" indent="0">
+              <a:buNone/>
+            </a:pPr>
             <a:endParaRPr lang="en-US" dirty="0">
               <a:latin typeface="Calibri" charset="0"/>
             </a:endParaRPr>
           </a:p>
           <a:p>
+            <a:pPr marL="0" indent="0">
+              <a:buNone/>
+            </a:pPr>
             <a:endParaRPr lang="en-US" dirty="0">
               <a:latin typeface="Calibri" charset="0"/>
             </a:endParaRPr>
@@ -10193,18 +10189,18 @@
       </p:sp>
       <p:graphicFrame>
         <p:nvGraphicFramePr>
-          <p:cNvPr id="4" name="Table 3"/>
+          <p:cNvPr id="5" name="Table 4"/>
           <p:cNvGraphicFramePr/>
           <p:nvPr>
             <p:extLst>
               <p:ext uri="{D42A27DB-BD31-4B8C-83A1-F6EECF244321}">
-                <p14:modId xmlns:p14="http://schemas.microsoft.com/office/powerpoint/2010/main" val="1537759153"/>
+                <p14:modId xmlns:p14="http://schemas.microsoft.com/office/powerpoint/2010/main" val="2054768350"/>
               </p:ext>
             </p:extLst>
           </p:nvPr>
         </p:nvGraphicFramePr>
         <p:xfrm>
-          <a:off x="1076973" y="3144281"/>
+          <a:off x="1004061" y="2753664"/>
           <a:ext cx="10183878" cy="1559560"/>
         </p:xfrm>
         <a:graphic>
@@ -10229,7 +10225,7 @@
                     <a:lstStyle/>
                     <a:p>
                       <a:r>
-                        <a:rPr lang="en-US"/>
+                        <a:rPr lang="en-US" dirty="0"/>
                         <a:t>With Java 8</a:t>
                       </a:r>
                     </a:p>
@@ -10270,36 +10266,13 @@
                         <a:rPr lang="en-US" dirty="0" err="1">
                           <a:latin typeface="Courier New" charset="0"/>
                         </a:rPr>
-                        <a:t>containsName</a:t>
-                      </a:r>
-                      <a:r>
-                        <a:rPr lang="en-US" dirty="0">
-                          <a:latin typeface="Courier New" charset="0"/>
-                        </a:rPr>
-                        <a:t>(String name) {</a:t>
-                      </a:r>
-                      <a:br>
-                        <a:rPr lang="en-US" dirty="0">
-                          <a:latin typeface="Courier New" charset="0"/>
-                        </a:rPr>
-                      </a:br>
-                      <a:r>
-                        <a:rPr lang="en-US" dirty="0">
-                          <a:latin typeface="Courier New" charset="0"/>
-                        </a:rPr>
-                        <a:t>    return </a:t>
-                      </a:r>
-                      <a:r>
-                        <a:rPr lang="en-US" dirty="0" err="1">
-                          <a:latin typeface="Courier New" charset="0"/>
-                        </a:rPr>
-                        <a:t>employees.stream</a:t>
-                      </a:r>
-                      <a:r>
-                        <a:rPr lang="en-US" dirty="0">
-                          <a:latin typeface="Courier New" charset="0"/>
-                        </a:rPr>
-                        <a:t>()</a:t>
+                        <a:t>existsEmployeeAtOffice</a:t>
+                      </a:r>
+                      <a:r>
+                        <a:rPr lang="en-US" dirty="0">
+                          <a:latin typeface="Courier New" charset="0"/>
+                        </a:rPr>
+                        <a:t>(String office){</a:t>
                       </a:r>
                     </a:p>
                     <a:p>
@@ -10307,12 +10280,32 @@
                         <a:rPr lang="en-US" dirty="0">
                           <a:latin typeface="Courier New" charset="0"/>
                         </a:rPr>
-                        <a:t>               .</a:t>
+                        <a:t>return </a:t>
                       </a:r>
                       <a:r>
                         <a:rPr lang="en-US" dirty="0" err="1">
                           <a:latin typeface="Courier New" charset="0"/>
                         </a:rPr>
+                        <a:t>employees.stream</a:t>
+                      </a:r>
+                      <a:r>
+                        <a:rPr lang="en-US" dirty="0">
+                          <a:latin typeface="Courier New" charset="0"/>
+                        </a:rPr>
+                        <a:t>()</a:t>
+                      </a:r>
+                    </a:p>
+                    <a:p>
+                      <a:r>
+                        <a:rPr lang="en-US" dirty="0">
+                          <a:latin typeface="Courier New" charset="0"/>
+                        </a:rPr>
+                        <a:t>            .</a:t>
+                      </a:r>
+                      <a:r>
+                        <a:rPr lang="en-US" dirty="0" err="1">
+                          <a:latin typeface="Courier New" charset="0"/>
+                        </a:rPr>
                         <a:t>anyMatch</a:t>
                       </a:r>
                       <a:r>
@@ -10325,19 +10318,16 @@
                         <a:rPr lang="en-US" dirty="0" err="1">
                           <a:latin typeface="Courier New" charset="0"/>
                         </a:rPr>
-                        <a:t>employee.getName</a:t>
-                      </a:r>
-                      <a:r>
-                        <a:rPr lang="en-US" dirty="0">
-                          <a:latin typeface="Courier New" charset="0"/>
-                        </a:rPr>
-                        <a:t>().equals(name));</a:t>
-                      </a:r>
-                      <a:br>
-                        <a:rPr lang="en-US" dirty="0">
-                          <a:latin typeface="Courier New" charset="0"/>
-                        </a:rPr>
-                      </a:br>
+                        <a:t>employee.getOffice</a:t>
+                      </a:r>
+                      <a:r>
+                        <a:rPr lang="en-US" dirty="0">
+                          <a:latin typeface="Courier New" charset="0"/>
+                        </a:rPr>
+                        <a:t>().equals(office));</a:t>
+                      </a:r>
+                    </a:p>
+                    <a:p>
                       <a:r>
                         <a:rPr lang="en-US" dirty="0">
                           <a:latin typeface="Courier New" charset="0"/>
@@ -14704,13 +14694,7 @@
                         <a:rPr lang="en-US" dirty="0">
                           <a:latin typeface="Courier New" charset="0"/>
                         </a:rPr>
-                        <a:t> </a:t>
-                      </a:r>
-                      <a:r>
-                        <a:rPr lang="en-US" dirty="0">
-                          <a:latin typeface="Courier New" charset="0"/>
-                        </a:rPr>
-                        <a:t>() {</a:t>
+                        <a:t> () {</a:t>
                       </a:r>
                     </a:p>
                     <a:p>
@@ -17628,17 +17612,8 @@
               <a:rPr lang="en-US" dirty="0">
                 <a:latin typeface="Calibri Light" charset="0"/>
               </a:rPr>
-              <a:t>Exercise: </a:t>
-            </a:r>
-            <a:r>
-              <a:rPr lang="en-US" dirty="0">
-                <a:latin typeface="Calibri Light" charset="0"/>
-              </a:rPr>
-              <a:t>A New Way to Collect</a:t>
-            </a:r>
-            <a:endParaRPr lang="en-US" dirty="0">
-              <a:latin typeface="Calibri Light" charset="0"/>
-            </a:endParaRPr>
+              <a:t>Exercise: A New Way to Collect</a:t>
+            </a:r>
           </a:p>
         </p:txBody>
       </p:sp>
@@ -19492,7 +19467,7 @@
               <a:rPr lang="en-US" dirty="0">
                 <a:latin typeface="Calibri" charset="0"/>
               </a:rPr>
-              <a:t>Goal: Write a method that returns the 10 highest paid employees in Ann Arbor</a:t>
+              <a:t>Goal: Write a method that returns the highest paid employees at a given office</a:t>
             </a:r>
           </a:p>
         </p:txBody>
@@ -19504,7 +19479,7 @@
           <p:nvPr>
             <p:extLst>
               <p:ext uri="{D42A27DB-BD31-4B8C-83A1-F6EECF244321}">
-                <p14:modId xmlns:p14="http://schemas.microsoft.com/office/powerpoint/2010/main" val="3815099597"/>
+                <p14:modId xmlns:p14="http://schemas.microsoft.com/office/powerpoint/2010/main" val="2761484411"/>
               </p:ext>
             </p:extLst>
           </p:nvPr>
@@ -19640,7 +19615,7 @@
                         <a:rPr lang="en-US" dirty="0">
                           <a:latin typeface="Courier New" charset="0"/>
                         </a:rPr>
-                        <a:t>().equals("Ann Arbor"))</a:t>
+                        <a:t>().equals(office))</a:t>
                       </a:r>
                       <a:br>
                         <a:rPr lang="en-US" dirty="0">
@@ -19662,7 +19637,7 @@
                         <a:rPr lang="en-US" dirty="0">
                           <a:latin typeface="Courier New" charset="0"/>
                         </a:rPr>
-                        <a:t>      .limit(10)</a:t>
+                        <a:t>      .limit(limit)</a:t>
                       </a:r>
                       <a:br>
                         <a:rPr lang="en-US" dirty="0">
@@ -21627,7 +21602,7 @@
           <a:lstStyle/>
           <a:p>
             <a:r>
-              <a:rPr lang="en-US"/>
+              <a:rPr lang="en-US" dirty="0"/>
               <a:t>Recap of Stream Methods</a:t>
             </a:r>
           </a:p>
@@ -21646,19 +21621,19 @@
         <p:spPr/>
         <p:txBody>
           <a:bodyPr vert="horz" lIns="91440" tIns="45720" rIns="91440" bIns="45720" rtlCol="0" anchor="t">
-            <a:normAutofit/>
+            <a:normAutofit lnSpcReduction="10000"/>
           </a:bodyPr>
           <a:lstStyle/>
           <a:p>
             <a:r>
-              <a:rPr lang="en-US"/>
+              <a:rPr lang="en-US" dirty="0"/>
               <a:t>Intermediate Operations</a:t>
             </a:r>
           </a:p>
           <a:p>
             <a:pPr lvl="1"/>
             <a:r>
-              <a:rPr lang="en-US">
+              <a:rPr lang="en-US" dirty="0">
                 <a:latin typeface="Courier New"/>
               </a:rPr>
               <a:t>map()</a:t>
@@ -21667,7 +21642,7 @@
           <a:p>
             <a:pPr lvl="1"/>
             <a:r>
-              <a:rPr lang="en-US">
+              <a:rPr lang="en-US" dirty="0">
                 <a:latin typeface="Courier New"/>
               </a:rPr>
               <a:t>filter()</a:t>
@@ -21676,7 +21651,7 @@
           <a:p>
             <a:pPr lvl="1"/>
             <a:r>
-              <a:rPr lang="en-US">
+              <a:rPr lang="en-US" dirty="0">
                 <a:latin typeface="Courier New"/>
               </a:rPr>
               <a:t>distinct()</a:t>
@@ -21685,7 +21660,7 @@
           <a:p>
             <a:pPr lvl="1"/>
             <a:r>
-              <a:rPr lang="en-US">
+              <a:rPr lang="en-US" dirty="0">
                 <a:latin typeface="Courier New"/>
               </a:rPr>
               <a:t>sorted()</a:t>
@@ -21694,7 +21669,7 @@
           <a:p>
             <a:pPr lvl="1"/>
             <a:r>
-              <a:rPr lang="en-US">
+              <a:rPr lang="en-US" dirty="0">
                 <a:latin typeface="Courier New"/>
               </a:rPr>
               <a:t>limit()</a:t>
@@ -21703,10 +21678,46 @@
           <a:p>
             <a:pPr lvl="1"/>
             <a:r>
-              <a:rPr lang="en-US">
+              <a:rPr lang="en-US" dirty="0" err="1">
                 <a:latin typeface="Courier New"/>
               </a:rPr>
-              <a:t>mapToInt(), mapToDouble(), mapToLong()</a:t>
+              <a:t>mapToInt</a:t>
+            </a:r>
+            <a:r>
+              <a:rPr lang="en-US" dirty="0">
+                <a:latin typeface="Courier New"/>
+              </a:rPr>
+              <a:t>()</a:t>
+            </a:r>
+          </a:p>
+          <a:p>
+            <a:pPr lvl="1"/>
+            <a:r>
+              <a:rPr lang="en-US" dirty="0" err="1">
+                <a:latin typeface="Courier New"/>
+              </a:rPr>
+              <a:t>mapToDouble</a:t>
+            </a:r>
+            <a:r>
+              <a:rPr lang="en-US" dirty="0">
+                <a:latin typeface="Courier New"/>
+              </a:rPr>
+              <a:t>()</a:t>
+            </a:r>
+          </a:p>
+          <a:p>
+            <a:pPr lvl="1"/>
+            <a:r>
+              <a:rPr lang="en-US" dirty="0" err="1">
+                <a:latin typeface="Courier New"/>
+              </a:rPr>
+              <a:t>mapToLong</a:t>
+            </a:r>
+            <a:r>
+              <a:rPr lang="en-US" dirty="0">
+                <a:latin typeface="Courier New"/>
+              </a:rPr>
+              <a:t>()</a:t>
             </a:r>
           </a:p>
         </p:txBody>
@@ -21721,62 +21732,287 @@
             <p:ph sz="half" idx="2"/>
           </p:nvPr>
         </p:nvSpPr>
-        <p:spPr/>
+        <p:spPr>
+          <a:xfrm>
+            <a:off x="4998128" y="1825625"/>
+            <a:ext cx="6355672" cy="4351338"/>
+          </a:xfrm>
+        </p:spPr>
         <p:txBody>
           <a:bodyPr vert="horz" lIns="91440" tIns="45720" rIns="91440" bIns="45720" rtlCol="0" anchor="t">
-            <a:normAutofit/>
+            <a:normAutofit lnSpcReduction="10000"/>
           </a:bodyPr>
           <a:lstStyle/>
           <a:p>
             <a:r>
-              <a:rPr lang="en-US"/>
+              <a:rPr lang="en-US" dirty="0"/>
               <a:t>Terminal Operations</a:t>
             </a:r>
           </a:p>
           <a:p>
             <a:pPr lvl="1"/>
             <a:r>
-              <a:rPr lang="en-US">
+              <a:rPr lang="en-US" dirty="0" err="1">
                 <a:latin typeface="Courier New"/>
               </a:rPr>
-              <a:t>anyMatch(), allMatch(), noneMatch()</a:t>
-            </a:r>
+              <a:t>anyMatch</a:t>
+            </a:r>
+            <a:r>
+              <a:rPr lang="en-US" dirty="0">
+                <a:latin typeface="Courier New"/>
+              </a:rPr>
+              <a:t>()</a:t>
+            </a:r>
+            <a:r>
+              <a:rPr lang="en-US" dirty="0"/>
+              <a:t>returns </a:t>
+            </a:r>
+            <a:r>
+              <a:rPr lang="en-US" dirty="0" err="1">
+                <a:latin typeface="Courier New"/>
+              </a:rPr>
+              <a:t>boolean</a:t>
+            </a:r>
+            <a:endParaRPr lang="en-US" dirty="0">
+              <a:latin typeface="Courier New"/>
+            </a:endParaRPr>
           </a:p>
           <a:p>
             <a:pPr lvl="1"/>
             <a:r>
-              <a:rPr lang="en-US">
+              <a:rPr lang="en-US" dirty="0" err="1">
                 <a:latin typeface="Courier New"/>
               </a:rPr>
-              <a:t>max(), min()</a:t>
-            </a:r>
+              <a:t>allMatch</a:t>
+            </a:r>
+            <a:r>
+              <a:rPr lang="en-US" dirty="0">
+                <a:latin typeface="Courier New"/>
+              </a:rPr>
+              <a:t>()</a:t>
+            </a:r>
+            <a:r>
+              <a:rPr lang="en-US" dirty="0"/>
+              <a:t> returns </a:t>
+            </a:r>
+            <a:r>
+              <a:rPr lang="en-US" dirty="0" err="1">
+                <a:latin typeface="Courier New"/>
+              </a:rPr>
+              <a:t>boolean</a:t>
+            </a:r>
+            <a:endParaRPr lang="en-US" dirty="0">
+              <a:latin typeface="Courier New"/>
+            </a:endParaRPr>
           </a:p>
           <a:p>
             <a:pPr lvl="1"/>
             <a:r>
-              <a:rPr lang="en-US">
+              <a:rPr lang="en-US" dirty="0" err="1">
                 <a:latin typeface="Courier New"/>
               </a:rPr>
+              <a:t>noneMatch</a:t>
+            </a:r>
+            <a:r>
+              <a:rPr lang="en-US" dirty="0">
+                <a:latin typeface="Courier New"/>
+              </a:rPr>
+              <a:t>()</a:t>
+            </a:r>
+            <a:r>
+              <a:rPr lang="en-US" dirty="0"/>
+              <a:t> returns </a:t>
+            </a:r>
+            <a:r>
+              <a:rPr lang="en-US" dirty="0" err="1">
+                <a:latin typeface="Courier New"/>
+              </a:rPr>
+              <a:t>boolean</a:t>
+            </a:r>
+            <a:endParaRPr lang="en-US" dirty="0">
+              <a:latin typeface="Courier New"/>
+            </a:endParaRPr>
+          </a:p>
+          <a:p>
+            <a:pPr lvl="1"/>
+            <a:r>
+              <a:rPr lang="en-US" dirty="0">
+                <a:latin typeface="Courier New"/>
+              </a:rPr>
+              <a:t>max()</a:t>
+            </a:r>
+            <a:r>
+              <a:rPr lang="en-US" dirty="0"/>
+              <a:t> returns </a:t>
+            </a:r>
+            <a:r>
+              <a:rPr lang="en-US" dirty="0">
+                <a:latin typeface="Courier New"/>
+              </a:rPr>
+              <a:t>Optional</a:t>
+            </a:r>
+            <a:endParaRPr lang="en-US" dirty="0">
+              <a:latin typeface="Courier New"/>
+            </a:endParaRPr>
+          </a:p>
+          <a:p>
+            <a:pPr lvl="1"/>
+            <a:r>
+              <a:rPr lang="en-US" dirty="0">
+                <a:latin typeface="Courier New"/>
+              </a:rPr>
+              <a:t>min()</a:t>
+            </a:r>
+            <a:r>
+              <a:rPr lang="en-US" dirty="0"/>
+              <a:t> returns </a:t>
+            </a:r>
+            <a:r>
+              <a:rPr lang="en-US" dirty="0">
+                <a:latin typeface="Courier New"/>
+              </a:rPr>
+              <a:t>Optional</a:t>
+            </a:r>
+            <a:endParaRPr lang="en-US" dirty="0">
+              <a:latin typeface="Courier New"/>
+            </a:endParaRPr>
+          </a:p>
+          <a:p>
+            <a:pPr lvl="1"/>
+            <a:r>
+              <a:rPr lang="en-US" dirty="0">
+                <a:latin typeface="Courier New"/>
+              </a:rPr>
               <a:t>collect()</a:t>
             </a:r>
           </a:p>
           <a:p>
+            <a:pPr lvl="2"/>
+            <a:r>
+              <a:rPr lang="en-US" dirty="0" err="1">
+                <a:latin typeface="Courier New"/>
+              </a:rPr>
+              <a:t>Collectors.toList</a:t>
+            </a:r>
+            <a:r>
+              <a:rPr lang="en-US" dirty="0">
+                <a:latin typeface="Courier New"/>
+              </a:rPr>
+              <a:t>()</a:t>
+            </a:r>
+            <a:r>
+              <a:rPr lang="en-US" dirty="0"/>
+              <a:t> returns </a:t>
+            </a:r>
+            <a:r>
+              <a:rPr lang="en-US" dirty="0">
+                <a:latin typeface="Courier New"/>
+              </a:rPr>
+              <a:t>List</a:t>
+            </a:r>
+          </a:p>
+          <a:p>
+            <a:pPr lvl="2"/>
+            <a:r>
+              <a:rPr lang="en-US" dirty="0" err="1">
+                <a:latin typeface="Courier New"/>
+              </a:rPr>
+              <a:t>Collectors.toSet</a:t>
+            </a:r>
+            <a:r>
+              <a:rPr lang="en-US" dirty="0">
+                <a:latin typeface="Courier New"/>
+              </a:rPr>
+              <a:t>()</a:t>
+            </a:r>
+            <a:r>
+              <a:rPr lang="en-US" dirty="0"/>
+              <a:t> returns </a:t>
+            </a:r>
+            <a:r>
+              <a:rPr lang="en-US" dirty="0">
+                <a:latin typeface="Courier New"/>
+              </a:rPr>
+              <a:t>Set</a:t>
+            </a:r>
+          </a:p>
+          <a:p>
+            <a:pPr lvl="2"/>
+            <a:r>
+              <a:rPr lang="en-US" dirty="0" err="1">
+                <a:latin typeface="Courier New"/>
+              </a:rPr>
+              <a:t>Collectors.joining</a:t>
+            </a:r>
+            <a:r>
+              <a:rPr lang="en-US" dirty="0">
+                <a:latin typeface="Courier New"/>
+              </a:rPr>
+              <a:t>()</a:t>
+            </a:r>
+            <a:r>
+              <a:rPr lang="en-US" dirty="0"/>
+              <a:t> returns </a:t>
+            </a:r>
+            <a:r>
+              <a:rPr lang="en-US" dirty="0">
+                <a:latin typeface="Courier New"/>
+              </a:rPr>
+              <a:t>String</a:t>
+            </a:r>
+            <a:endParaRPr lang="en-US" dirty="0">
+              <a:latin typeface="Courier New"/>
+            </a:endParaRPr>
+          </a:p>
+          <a:p>
             <a:pPr lvl="1"/>
             <a:r>
-              <a:rPr lang="en-US">
+              <a:rPr lang="en-US" dirty="0">
                 <a:latin typeface="Courier New"/>
               </a:rPr>
               <a:t>count()</a:t>
             </a:r>
+            <a:r>
+              <a:rPr lang="en-US" dirty="0"/>
+              <a:t> returns </a:t>
+            </a:r>
+            <a:r>
+              <a:rPr lang="en-US" dirty="0">
+                <a:latin typeface="Courier New"/>
+              </a:rPr>
+              <a:t>Long</a:t>
+            </a:r>
+            <a:endParaRPr lang="en-US" dirty="0">
+              <a:latin typeface="Courier New"/>
+            </a:endParaRPr>
           </a:p>
           <a:p>
             <a:pPr lvl="1"/>
             <a:r>
-              <a:rPr lang="en-US">
+              <a:rPr lang="en-US" dirty="0" err="1">
                 <a:latin typeface="Courier New"/>
               </a:rPr>
-              <a:t>findAny()</a:t>
-            </a:r>
+              <a:t>findAny</a:t>
+            </a:r>
+            <a:r>
+              <a:rPr lang="en-US" dirty="0">
+                <a:latin typeface="Courier New"/>
+              </a:rPr>
+              <a:t>()</a:t>
+            </a:r>
+            <a:r>
+              <a:rPr lang="en-US" dirty="0"/>
+              <a:t> returns </a:t>
+            </a:r>
+            <a:r>
+              <a:rPr lang="en-US" dirty="0">
+                <a:latin typeface="Courier New"/>
+              </a:rPr>
+              <a:t>Optional</a:t>
+            </a:r>
+            <a:endParaRPr lang="en-US" dirty="0">
+              <a:latin typeface="Courier New"/>
+            </a:endParaRPr>
           </a:p>
         </p:txBody>
       </p:sp>

</xml_diff>